<commit_message>
DB create tables sql script. Minor corrections on db schema. Extra relationship was removed, and two column names corrected.
</commit_message>
<xml_diff>
--- a/diagrams/dmd/domainModel.pptx
+++ b/diagrams/dmd/domainModel.pptx
@@ -289,7 +289,7 @@
           <a:p>
             <a:fld id="{DCF155DA-1BAC-41A4-AEA2-7DD759E9BDBC}" type="datetimeFigureOut">
               <a:rPr lang="en-US" smtClean="0"/>
-              <a:t>15-Nov-15</a:t>
+              <a:t>16-Nov-15</a:t>
             </a:fld>
             <a:endParaRPr lang="en-US"/>
           </a:p>
@@ -459,7 +459,7 @@
           <a:p>
             <a:fld id="{DCF155DA-1BAC-41A4-AEA2-7DD759E9BDBC}" type="datetimeFigureOut">
               <a:rPr lang="en-US" smtClean="0"/>
-              <a:t>15-Nov-15</a:t>
+              <a:t>16-Nov-15</a:t>
             </a:fld>
             <a:endParaRPr lang="en-US"/>
           </a:p>
@@ -639,7 +639,7 @@
           <a:p>
             <a:fld id="{DCF155DA-1BAC-41A4-AEA2-7DD759E9BDBC}" type="datetimeFigureOut">
               <a:rPr lang="en-US" smtClean="0"/>
-              <a:t>15-Nov-15</a:t>
+              <a:t>16-Nov-15</a:t>
             </a:fld>
             <a:endParaRPr lang="en-US"/>
           </a:p>
@@ -809,7 +809,7 @@
           <a:p>
             <a:fld id="{DCF155DA-1BAC-41A4-AEA2-7DD759E9BDBC}" type="datetimeFigureOut">
               <a:rPr lang="en-US" smtClean="0"/>
-              <a:t>15-Nov-15</a:t>
+              <a:t>16-Nov-15</a:t>
             </a:fld>
             <a:endParaRPr lang="en-US"/>
           </a:p>
@@ -1055,7 +1055,7 @@
           <a:p>
             <a:fld id="{DCF155DA-1BAC-41A4-AEA2-7DD759E9BDBC}" type="datetimeFigureOut">
               <a:rPr lang="en-US" smtClean="0"/>
-              <a:t>15-Nov-15</a:t>
+              <a:t>16-Nov-15</a:t>
             </a:fld>
             <a:endParaRPr lang="en-US"/>
           </a:p>
@@ -1343,7 +1343,7 @@
           <a:p>
             <a:fld id="{DCF155DA-1BAC-41A4-AEA2-7DD759E9BDBC}" type="datetimeFigureOut">
               <a:rPr lang="en-US" smtClean="0"/>
-              <a:t>15-Nov-15</a:t>
+              <a:t>16-Nov-15</a:t>
             </a:fld>
             <a:endParaRPr lang="en-US"/>
           </a:p>
@@ -1770,7 +1770,7 @@
           <a:p>
             <a:fld id="{DCF155DA-1BAC-41A4-AEA2-7DD759E9BDBC}" type="datetimeFigureOut">
               <a:rPr lang="en-US" smtClean="0"/>
-              <a:t>15-Nov-15</a:t>
+              <a:t>16-Nov-15</a:t>
             </a:fld>
             <a:endParaRPr lang="en-US"/>
           </a:p>
@@ -1888,7 +1888,7 @@
           <a:p>
             <a:fld id="{DCF155DA-1BAC-41A4-AEA2-7DD759E9BDBC}" type="datetimeFigureOut">
               <a:rPr lang="en-US" smtClean="0"/>
-              <a:t>15-Nov-15</a:t>
+              <a:t>16-Nov-15</a:t>
             </a:fld>
             <a:endParaRPr lang="en-US"/>
           </a:p>
@@ -1983,7 +1983,7 @@
           <a:p>
             <a:fld id="{DCF155DA-1BAC-41A4-AEA2-7DD759E9BDBC}" type="datetimeFigureOut">
               <a:rPr lang="en-US" smtClean="0"/>
-              <a:t>15-Nov-15</a:t>
+              <a:t>16-Nov-15</a:t>
             </a:fld>
             <a:endParaRPr lang="en-US"/>
           </a:p>
@@ -2260,7 +2260,7 @@
           <a:p>
             <a:fld id="{DCF155DA-1BAC-41A4-AEA2-7DD759E9BDBC}" type="datetimeFigureOut">
               <a:rPr lang="en-US" smtClean="0"/>
-              <a:t>15-Nov-15</a:t>
+              <a:t>16-Nov-15</a:t>
             </a:fld>
             <a:endParaRPr lang="en-US"/>
           </a:p>
@@ -2513,7 +2513,7 @@
           <a:p>
             <a:fld id="{DCF155DA-1BAC-41A4-AEA2-7DD759E9BDBC}" type="datetimeFigureOut">
               <a:rPr lang="en-US" smtClean="0"/>
-              <a:t>15-Nov-15</a:t>
+              <a:t>16-Nov-15</a:t>
             </a:fld>
             <a:endParaRPr lang="en-US"/>
           </a:p>
@@ -2726,7 +2726,7 @@
           <a:p>
             <a:fld id="{DCF155DA-1BAC-41A4-AEA2-7DD759E9BDBC}" type="datetimeFigureOut">
               <a:rPr lang="en-US" smtClean="0"/>
-              <a:t>15-Nov-15</a:t>
+              <a:t>16-Nov-15</a:t>
             </a:fld>
             <a:endParaRPr lang="en-US"/>
           </a:p>
@@ -3361,19 +3361,7 @@
                   </a:solidFill>
                   <a:latin typeface="Lucida Console" panose="020B0609040504020204" pitchFamily="49" charset="0"/>
                 </a:rPr>
-                <a:t>manufactureDateTime: </a:t>
-              </a:r>
-              <a:r>
-                <a:rPr lang="en-US" sz="1000" smtClean="0">
-                  <a:solidFill>
-                    <a:schemeClr val="tx1">
-                      <a:lumMod val="65000"/>
-                      <a:lumOff val="35000"/>
-                    </a:schemeClr>
-                  </a:solidFill>
-                  <a:latin typeface="Lucida Console" panose="020B0609040504020204" pitchFamily="49" charset="0"/>
-                </a:rPr>
-                <a:t>dateTime</a:t>
+                <a:t>manufactureDateTime: dateTime</a:t>
               </a:r>
             </a:p>
             <a:p>
@@ -4344,9 +4332,6 @@
               </a:rPr>
               <a:t>*</a:t>
             </a:r>
-            <a:endParaRPr lang="en-US" sz="1000">
-              <a:latin typeface="Lucida Console" panose="020B0609040504020204" pitchFamily="49" charset="0"/>
-            </a:endParaRPr>
           </a:p>
         </p:txBody>
       </p:sp>
@@ -5242,19 +5227,7 @@
                   </a:solidFill>
                   <a:latin typeface="Lucida Console" panose="020B0609040504020204" pitchFamily="49" charset="0"/>
                 </a:rPr>
-                <a:t>creationTimeStamp: </a:t>
-              </a:r>
-              <a:r>
-                <a:rPr lang="en-US" sz="1000" smtClean="0">
-                  <a:solidFill>
-                    <a:schemeClr val="tx1">
-                      <a:lumMod val="65000"/>
-                      <a:lumOff val="35000"/>
-                    </a:schemeClr>
-                  </a:solidFill>
-                  <a:latin typeface="Lucida Console" panose="020B0609040504020204" pitchFamily="49" charset="0"/>
-                </a:rPr>
-                <a:t>dateTime</a:t>
+                <a:t>creationTimeStamp: dateTime</a:t>
               </a:r>
             </a:p>
             <a:p>
@@ -5296,19 +5269,7 @@
                   </a:solidFill>
                   <a:latin typeface="Lucida Console" panose="020B0609040504020204" pitchFamily="49" charset="0"/>
                 </a:rPr>
-                <a:t>status: </a:t>
-              </a:r>
-              <a:r>
-                <a:rPr lang="en-US" sz="1000" smtClean="0">
-                  <a:solidFill>
-                    <a:schemeClr val="tx1">
-                      <a:lumMod val="65000"/>
-                      <a:lumOff val="35000"/>
-                    </a:schemeClr>
-                  </a:solidFill>
-                  <a:latin typeface="Lucida Console" panose="020B0609040504020204" pitchFamily="49" charset="0"/>
-                </a:rPr>
-                <a:t>string</a:t>
+                <a:t>status: string</a:t>
               </a:r>
             </a:p>
             <a:p>
@@ -5338,15 +5299,6 @@
                 </a:rPr>
                 <a:t>price: double</a:t>
               </a:r>
-              <a:endParaRPr lang="en-US" sz="1000" smtClean="0">
-                <a:solidFill>
-                  <a:schemeClr val="tx1">
-                    <a:lumMod val="65000"/>
-                    <a:lumOff val="35000"/>
-                  </a:schemeClr>
-                </a:solidFill>
-                <a:latin typeface="Lucida Console" panose="020B0609040504020204" pitchFamily="49" charset="0"/>
-              </a:endParaRPr>
             </a:p>
           </p:txBody>
         </p:sp>
@@ -5692,19 +5644,7 @@
                   </a:solidFill>
                   <a:latin typeface="Lucida Console" panose="020B0609040504020204" pitchFamily="49" charset="0"/>
                 </a:rPr>
-                <a:t>creationTimeStamp: </a:t>
-              </a:r>
-              <a:r>
-                <a:rPr lang="en-US" sz="1000" smtClean="0">
-                  <a:solidFill>
-                    <a:schemeClr val="tx1">
-                      <a:lumMod val="65000"/>
-                      <a:lumOff val="35000"/>
-                    </a:schemeClr>
-                  </a:solidFill>
-                  <a:latin typeface="Lucida Console" panose="020B0609040504020204" pitchFamily="49" charset="0"/>
-                </a:rPr>
-                <a:t>dateTime</a:t>
+                <a:t>creationTimeStamp: dateTime</a:t>
               </a:r>
             </a:p>
             <a:p>
@@ -6642,9 +6582,9 @@
         <p:grpSpPr>
           <a:xfrm>
             <a:off x="2391868" y="216074"/>
-            <a:ext cx="5652000" cy="543474"/>
+            <a:ext cx="5796000" cy="543474"/>
             <a:chOff x="2202622" y="616068"/>
-            <a:chExt cx="5652000" cy="543474"/>
+            <a:chExt cx="5796000" cy="543474"/>
           </a:xfrm>
         </p:grpSpPr>
         <p:sp>
@@ -6656,7 +6596,7 @@
           <p:spPr>
             <a:xfrm>
               <a:off x="2202622" y="616068"/>
-              <a:ext cx="5652000" cy="540000"/>
+              <a:ext cx="5796000" cy="540000"/>
             </a:xfrm>
             <a:prstGeom prst="roundRect">
               <a:avLst>
@@ -6718,15 +6658,6 @@
                 </a:rPr>
                 <a:t>sms</a:t>
               </a:r>
-              <a:endParaRPr lang="en-US" sz="1200" b="1" smtClean="0">
-                <a:solidFill>
-                  <a:schemeClr val="tx1">
-                    <a:lumMod val="65000"/>
-                    <a:lumOff val="35000"/>
-                  </a:schemeClr>
-                </a:solidFill>
-                <a:latin typeface="Lucida Sans" panose="020B0602030504020204" pitchFamily="34" charset="0"/>
-              </a:endParaRPr>
             </a:p>
           </p:txBody>
         </p:sp>
@@ -6801,15 +6732,6 @@
                 </a:rPr>
                 <a:t>id</a:t>
               </a:r>
-              <a:endParaRPr lang="en-US" sz="1000" b="1" smtClean="0">
-                <a:solidFill>
-                  <a:schemeClr val="tx1">
-                    <a:lumMod val="65000"/>
-                    <a:lumOff val="35000"/>
-                  </a:schemeClr>
-                </a:solidFill>
-                <a:latin typeface="Lucida Console" panose="020B0609040504020204" pitchFamily="49" charset="0"/>
-              </a:endParaRPr>
             </a:p>
           </p:txBody>
         </p:sp>
@@ -6884,15 +6806,6 @@
                 </a:rPr>
                 <a:t>creation_ts</a:t>
               </a:r>
-              <a:endParaRPr lang="en-US" sz="1000" smtClean="0">
-                <a:solidFill>
-                  <a:schemeClr val="tx1">
-                    <a:lumMod val="65000"/>
-                    <a:lumOff val="35000"/>
-                  </a:schemeClr>
-                </a:solidFill>
-                <a:latin typeface="Lucida Console" panose="020B0609040504020204" pitchFamily="49" charset="0"/>
-              </a:endParaRPr>
             </a:p>
           </p:txBody>
         </p:sp>
@@ -6967,15 +6880,6 @@
                 </a:rPr>
                 <a:t>text</a:t>
               </a:r>
-              <a:endParaRPr lang="en-US" sz="1000" smtClean="0">
-                <a:solidFill>
-                  <a:schemeClr val="tx1">
-                    <a:lumMod val="65000"/>
-                    <a:lumOff val="35000"/>
-                  </a:schemeClr>
-                </a:solidFill>
-                <a:latin typeface="Lucida Console" panose="020B0609040504020204" pitchFamily="49" charset="0"/>
-              </a:endParaRPr>
             </a:p>
           </p:txBody>
         </p:sp>
@@ -6988,7 +6892,7 @@
           <p:spPr>
             <a:xfrm>
               <a:off x="4118844" y="904068"/>
-              <a:ext cx="648000" cy="252000"/>
+              <a:ext cx="720000" cy="252000"/>
             </a:xfrm>
             <a:prstGeom prst="rect">
               <a:avLst/>
@@ -7048,17 +6952,8 @@
                   </a:solidFill>
                   <a:latin typeface="Lucida Console" panose="020B0609040504020204" pitchFamily="49" charset="0"/>
                 </a:rPr>
-                <a:t>isSent</a:t>
+                <a:t>is_sent</a:t>
               </a:r>
-              <a:endParaRPr lang="en-US" sz="1000" smtClean="0">
-                <a:solidFill>
-                  <a:schemeClr val="tx1">
-                    <a:lumMod val="65000"/>
-                    <a:lumOff val="35000"/>
-                  </a:schemeClr>
-                </a:solidFill>
-                <a:latin typeface="Lucida Console" panose="020B0609040504020204" pitchFamily="49" charset="0"/>
-              </a:endParaRPr>
             </a:p>
           </p:txBody>
         </p:sp>
@@ -7070,7 +6965,81 @@
           </p:nvSpPr>
           <p:spPr>
             <a:xfrm>
-              <a:off x="4766844" y="904068"/>
+              <a:off x="4838844" y="904068"/>
+              <a:ext cx="1044000" cy="252000"/>
+            </a:xfrm>
+            <a:prstGeom prst="rect">
+              <a:avLst/>
+            </a:prstGeom>
+            <a:solidFill>
+              <a:schemeClr val="bg1"/>
+            </a:solidFill>
+            <a:ln w="6350">
+              <a:solidFill>
+                <a:schemeClr val="tx2">
+                  <a:lumMod val="20000"/>
+                  <a:lumOff val="80000"/>
+                </a:schemeClr>
+              </a:solidFill>
+            </a:ln>
+            <a:effectLst/>
+            <a:scene3d>
+              <a:camera prst="orthographicFront">
+                <a:rot lat="0" lon="0" rev="0"/>
+              </a:camera>
+              <a:lightRig rig="threePt" dir="t">
+                <a:rot lat="0" lon="0" rev="1200000"/>
+              </a:lightRig>
+            </a:scene3d>
+            <a:sp3d/>
+          </p:spPr>
+          <p:style>
+            <a:lnRef idx="0">
+              <a:schemeClr val="accent1"/>
+            </a:lnRef>
+            <a:fillRef idx="3">
+              <a:schemeClr val="accent1"/>
+            </a:fillRef>
+            <a:effectRef idx="3">
+              <a:schemeClr val="accent1"/>
+            </a:effectRef>
+            <a:fontRef idx="minor">
+              <a:schemeClr val="lt1"/>
+            </a:fontRef>
+          </p:style>
+          <p:txBody>
+            <a:bodyPr rot="0" spcFirstLastPara="0" vertOverflow="overflow" horzOverflow="overflow" vert="horz" wrap="square" lIns="91440" tIns="45720" rIns="91440" bIns="45720" numCol="1" spcCol="0" rtlCol="0" fromWordArt="0" anchor="t" anchorCtr="0" forceAA="0" compatLnSpc="1">
+              <a:prstTxWarp prst="textNoShape">
+                <a:avLst/>
+              </a:prstTxWarp>
+              <a:noAutofit/>
+            </a:bodyPr>
+            <a:lstStyle/>
+            <a:p>
+              <a:r>
+                <a:rPr lang="en-US" sz="1000" smtClean="0">
+                  <a:solidFill>
+                    <a:schemeClr val="tx1">
+                      <a:lumMod val="65000"/>
+                      <a:lumOff val="35000"/>
+                    </a:schemeClr>
+                  </a:solidFill>
+                  <a:latin typeface="Lucida Console" panose="020B0609040504020204" pitchFamily="49" charset="0"/>
+                </a:rPr>
+                <a:t>is_received</a:t>
+              </a:r>
+            </a:p>
+          </p:txBody>
+        </p:sp>
+        <p:sp>
+          <p:nvSpPr>
+            <p:cNvPr id="23" name="Rectangle 22"/>
+            <p:cNvSpPr/>
+            <p:nvPr/>
+          </p:nvSpPr>
+          <p:spPr>
+            <a:xfrm>
+              <a:off x="5885013" y="904068"/>
               <a:ext cx="972000" cy="252000"/>
             </a:xfrm>
             <a:prstGeom prst="rect">
@@ -7122,89 +7091,6 @@
             <a:lstStyle/>
             <a:p>
               <a:r>
-                <a:rPr lang="en-US" sz="1000" smtClean="0">
-                  <a:solidFill>
-                    <a:schemeClr val="tx1">
-                      <a:lumMod val="65000"/>
-                      <a:lumOff val="35000"/>
-                    </a:schemeClr>
-                  </a:solidFill>
-                  <a:latin typeface="Lucida Console" panose="020B0609040504020204" pitchFamily="49" charset="0"/>
-                </a:rPr>
-                <a:t>isReceived</a:t>
-              </a:r>
-              <a:endParaRPr lang="en-US" sz="1000" smtClean="0">
-                <a:solidFill>
-                  <a:schemeClr val="tx1">
-                    <a:lumMod val="65000"/>
-                    <a:lumOff val="35000"/>
-                  </a:schemeClr>
-                </a:solidFill>
-                <a:latin typeface="Lucida Console" panose="020B0609040504020204" pitchFamily="49" charset="0"/>
-              </a:endParaRPr>
-            </a:p>
-          </p:txBody>
-        </p:sp>
-        <p:sp>
-          <p:nvSpPr>
-            <p:cNvPr id="23" name="Rectangle 22"/>
-            <p:cNvSpPr/>
-            <p:nvPr/>
-          </p:nvSpPr>
-          <p:spPr>
-            <a:xfrm>
-              <a:off x="5738844" y="904068"/>
-              <a:ext cx="972000" cy="252000"/>
-            </a:xfrm>
-            <a:prstGeom prst="rect">
-              <a:avLst/>
-            </a:prstGeom>
-            <a:solidFill>
-              <a:schemeClr val="bg1"/>
-            </a:solidFill>
-            <a:ln w="6350">
-              <a:solidFill>
-                <a:schemeClr val="tx2">
-                  <a:lumMod val="20000"/>
-                  <a:lumOff val="80000"/>
-                </a:schemeClr>
-              </a:solidFill>
-            </a:ln>
-            <a:effectLst/>
-            <a:scene3d>
-              <a:camera prst="orthographicFront">
-                <a:rot lat="0" lon="0" rev="0"/>
-              </a:camera>
-              <a:lightRig rig="threePt" dir="t">
-                <a:rot lat="0" lon="0" rev="1200000"/>
-              </a:lightRig>
-            </a:scene3d>
-            <a:sp3d/>
-          </p:spPr>
-          <p:style>
-            <a:lnRef idx="0">
-              <a:schemeClr val="accent1"/>
-            </a:lnRef>
-            <a:fillRef idx="3">
-              <a:schemeClr val="accent1"/>
-            </a:fillRef>
-            <a:effectRef idx="3">
-              <a:schemeClr val="accent1"/>
-            </a:effectRef>
-            <a:fontRef idx="minor">
-              <a:schemeClr val="lt1"/>
-            </a:fontRef>
-          </p:style>
-          <p:txBody>
-            <a:bodyPr rot="0" spcFirstLastPara="0" vertOverflow="overflow" horzOverflow="overflow" vert="horz" wrap="square" lIns="91440" tIns="45720" rIns="91440" bIns="45720" numCol="1" spcCol="0" rtlCol="0" fromWordArt="0" anchor="t" anchorCtr="0" forceAA="0" compatLnSpc="1">
-              <a:prstTxWarp prst="textNoShape">
-                <a:avLst/>
-              </a:prstTxWarp>
-              <a:noAutofit/>
-            </a:bodyPr>
-            <a:lstStyle/>
-            <a:p>
-              <a:r>
                 <a:rPr lang="en-US" sz="1000" u="sng" smtClean="0">
                   <a:solidFill>
                     <a:schemeClr val="tx1">
@@ -7216,15 +7102,6 @@
                 </a:rPr>
                 <a:t>sender_id</a:t>
               </a:r>
-              <a:endParaRPr lang="en-US" sz="1000" u="sng" smtClean="0">
-                <a:solidFill>
-                  <a:schemeClr val="tx1">
-                    <a:lumMod val="65000"/>
-                    <a:lumOff val="35000"/>
-                  </a:schemeClr>
-                </a:solidFill>
-                <a:latin typeface="Lucida Console" panose="020B0609040504020204" pitchFamily="49" charset="0"/>
-              </a:endParaRPr>
             </a:p>
           </p:txBody>
         </p:sp>
@@ -7236,7 +7113,7 @@
           </p:nvSpPr>
           <p:spPr>
             <a:xfrm>
-              <a:off x="6710844" y="907542"/>
+              <a:off x="6857013" y="907542"/>
               <a:ext cx="1116000" cy="252000"/>
             </a:xfrm>
             <a:prstGeom prst="rect">
@@ -7299,15 +7176,6 @@
                 </a:rPr>
                 <a:t>recipient_id</a:t>
               </a:r>
-              <a:endParaRPr lang="en-US" sz="1000" u="sng" smtClean="0">
-                <a:solidFill>
-                  <a:schemeClr val="tx1">
-                    <a:lumMod val="65000"/>
-                    <a:lumOff val="35000"/>
-                  </a:schemeClr>
-                </a:solidFill>
-                <a:latin typeface="Lucida Console" panose="020B0609040504020204" pitchFamily="49" charset="0"/>
-              </a:endParaRPr>
             </a:p>
           </p:txBody>
         </p:sp>
@@ -7397,15 +7265,6 @@
                 </a:rPr>
                 <a:t>logistician</a:t>
               </a:r>
-              <a:endParaRPr lang="en-US" sz="1200" b="1" smtClean="0">
-                <a:solidFill>
-                  <a:schemeClr val="tx1">
-                    <a:lumMod val="65000"/>
-                    <a:lumOff val="35000"/>
-                  </a:schemeClr>
-                </a:solidFill>
-                <a:latin typeface="Lucida Sans" panose="020B0602030504020204" pitchFamily="34" charset="0"/>
-              </a:endParaRPr>
             </a:p>
           </p:txBody>
         </p:sp>
@@ -7480,15 +7339,6 @@
                 </a:rPr>
                 <a:t>id</a:t>
               </a:r>
-              <a:endParaRPr lang="en-US" sz="1000" b="1" u="sng" smtClean="0">
-                <a:solidFill>
-                  <a:schemeClr val="tx1">
-                    <a:lumMod val="65000"/>
-                    <a:lumOff val="35000"/>
-                  </a:schemeClr>
-                </a:solidFill>
-                <a:latin typeface="Lucida Console" panose="020B0609040504020204" pitchFamily="49" charset="0"/>
-              </a:endParaRPr>
             </a:p>
           </p:txBody>
         </p:sp>
@@ -7563,15 +7413,6 @@
                 </a:rPr>
                 <a:t>username</a:t>
               </a:r>
-              <a:endParaRPr lang="en-US" sz="1000" smtClean="0">
-                <a:solidFill>
-                  <a:schemeClr val="tx1">
-                    <a:lumMod val="65000"/>
-                    <a:lumOff val="35000"/>
-                  </a:schemeClr>
-                </a:solidFill>
-                <a:latin typeface="Lucida Console" panose="020B0609040504020204" pitchFamily="49" charset="0"/>
-              </a:endParaRPr>
             </a:p>
           </p:txBody>
         </p:sp>
@@ -7646,15 +7487,6 @@
                 </a:rPr>
                 <a:t>password</a:t>
               </a:r>
-              <a:endParaRPr lang="en-US" sz="1000" smtClean="0">
-                <a:solidFill>
-                  <a:schemeClr val="tx1">
-                    <a:lumMod val="65000"/>
-                    <a:lumOff val="35000"/>
-                  </a:schemeClr>
-                </a:solidFill>
-                <a:latin typeface="Lucida Console" panose="020B0609040504020204" pitchFamily="49" charset="0"/>
-              </a:endParaRPr>
             </a:p>
           </p:txBody>
         </p:sp>
@@ -7729,15 +7561,6 @@
                 </a:rPr>
                 <a:t>telephone</a:t>
               </a:r>
-              <a:endParaRPr lang="en-US" sz="1000" smtClean="0">
-                <a:solidFill>
-                  <a:schemeClr val="tx1">
-                    <a:lumMod val="65000"/>
-                    <a:lumOff val="35000"/>
-                  </a:schemeClr>
-                </a:solidFill>
-                <a:latin typeface="Lucida Console" panose="020B0609040504020204" pitchFamily="49" charset="0"/>
-              </a:endParaRPr>
             </a:p>
           </p:txBody>
         </p:sp>
@@ -7827,15 +7650,6 @@
                 </a:rPr>
                 <a:t>truck_driver</a:t>
               </a:r>
-              <a:endParaRPr lang="en-US" sz="1200" b="1" smtClean="0">
-                <a:solidFill>
-                  <a:schemeClr val="tx1">
-                    <a:lumMod val="65000"/>
-                    <a:lumOff val="35000"/>
-                  </a:schemeClr>
-                </a:solidFill>
-                <a:latin typeface="Lucida Sans" panose="020B0602030504020204" pitchFamily="34" charset="0"/>
-              </a:endParaRPr>
             </a:p>
           </p:txBody>
         </p:sp>
@@ -7910,15 +7724,6 @@
                 </a:rPr>
                 <a:t>id</a:t>
               </a:r>
-              <a:endParaRPr lang="en-US" sz="1000" b="1" u="sng" smtClean="0">
-                <a:solidFill>
-                  <a:schemeClr val="tx1">
-                    <a:lumMod val="65000"/>
-                    <a:lumOff val="35000"/>
-                  </a:schemeClr>
-                </a:solidFill>
-                <a:latin typeface="Lucida Console" panose="020B0609040504020204" pitchFamily="49" charset="0"/>
-              </a:endParaRPr>
             </a:p>
           </p:txBody>
         </p:sp>
@@ -7993,15 +7798,6 @@
                 </a:rPr>
                 <a:t>first_name</a:t>
               </a:r>
-              <a:endParaRPr lang="en-US" sz="1000" smtClean="0">
-                <a:solidFill>
-                  <a:schemeClr val="tx1">
-                    <a:lumMod val="65000"/>
-                    <a:lumOff val="35000"/>
-                  </a:schemeClr>
-                </a:solidFill>
-                <a:latin typeface="Lucida Console" panose="020B0609040504020204" pitchFamily="49" charset="0"/>
-              </a:endParaRPr>
             </a:p>
           </p:txBody>
         </p:sp>
@@ -8076,15 +7872,6 @@
                 </a:rPr>
                 <a:t>last_name</a:t>
               </a:r>
-              <a:endParaRPr lang="en-US" sz="1000" smtClean="0">
-                <a:solidFill>
-                  <a:schemeClr val="tx1">
-                    <a:lumMod val="65000"/>
-                    <a:lumOff val="35000"/>
-                  </a:schemeClr>
-                </a:solidFill>
-                <a:latin typeface="Lucida Console" panose="020B0609040504020204" pitchFamily="49" charset="0"/>
-              </a:endParaRPr>
             </a:p>
           </p:txBody>
         </p:sp>
@@ -8159,15 +7946,6 @@
                 </a:rPr>
                 <a:t>telephone</a:t>
               </a:r>
-              <a:endParaRPr lang="en-US" sz="1000" smtClean="0">
-                <a:solidFill>
-                  <a:schemeClr val="tx1">
-                    <a:lumMod val="65000"/>
-                    <a:lumOff val="35000"/>
-                  </a:schemeClr>
-                </a:solidFill>
-                <a:latin typeface="Lucida Console" panose="020B0609040504020204" pitchFamily="49" charset="0"/>
-              </a:endParaRPr>
             </a:p>
           </p:txBody>
         </p:sp>
@@ -8257,15 +8035,6 @@
                 </a:rPr>
                 <a:t>logistician_and_truck_driver</a:t>
               </a:r>
-              <a:endParaRPr lang="en-US" sz="1200" b="1" smtClean="0">
-                <a:solidFill>
-                  <a:schemeClr val="tx1">
-                    <a:lumMod val="65000"/>
-                    <a:lumOff val="35000"/>
-                  </a:schemeClr>
-                </a:solidFill>
-                <a:latin typeface="Lucida Sans" panose="020B0602030504020204" pitchFamily="34" charset="0"/>
-              </a:endParaRPr>
             </a:p>
           </p:txBody>
         </p:sp>
@@ -8340,15 +8109,6 @@
                 </a:rPr>
                 <a:t>logistician_id</a:t>
               </a:r>
-              <a:endParaRPr lang="en-US" sz="1000" b="1" u="sng" smtClean="0">
-                <a:solidFill>
-                  <a:schemeClr val="tx1">
-                    <a:lumMod val="65000"/>
-                    <a:lumOff val="35000"/>
-                  </a:schemeClr>
-                </a:solidFill>
-                <a:latin typeface="Lucida Console" panose="020B0609040504020204" pitchFamily="49" charset="0"/>
-              </a:endParaRPr>
             </a:p>
           </p:txBody>
         </p:sp>
@@ -8423,15 +8183,6 @@
                 </a:rPr>
                 <a:t>truck_driver_id</a:t>
               </a:r>
-              <a:endParaRPr lang="en-US" sz="1000" b="1" u="sng" smtClean="0">
-                <a:solidFill>
-                  <a:schemeClr val="tx1">
-                    <a:lumMod val="65000"/>
-                    <a:lumOff val="35000"/>
-                  </a:schemeClr>
-                </a:solidFill>
-                <a:latin typeface="Lucida Console" panose="020B0609040504020204" pitchFamily="49" charset="0"/>
-              </a:endParaRPr>
             </a:p>
           </p:txBody>
         </p:sp>
@@ -8521,15 +8272,6 @@
                 </a:rPr>
                 <a:t>truck_driver_and_truck</a:t>
               </a:r>
-              <a:endParaRPr lang="en-US" sz="1200" b="1" smtClean="0">
-                <a:solidFill>
-                  <a:schemeClr val="tx1">
-                    <a:lumMod val="65000"/>
-                    <a:lumOff val="35000"/>
-                  </a:schemeClr>
-                </a:solidFill>
-                <a:latin typeface="Lucida Sans" panose="020B0602030504020204" pitchFamily="34" charset="0"/>
-              </a:endParaRPr>
             </a:p>
           </p:txBody>
         </p:sp>
@@ -8604,15 +8346,6 @@
                 </a:rPr>
                 <a:t>truck_driver_id</a:t>
               </a:r>
-              <a:endParaRPr lang="en-US" sz="1000" b="1" u="sng" smtClean="0">
-                <a:solidFill>
-                  <a:schemeClr val="tx1">
-                    <a:lumMod val="65000"/>
-                    <a:lumOff val="35000"/>
-                  </a:schemeClr>
-                </a:solidFill>
-                <a:latin typeface="Lucida Console" panose="020B0609040504020204" pitchFamily="49" charset="0"/>
-              </a:endParaRPr>
             </a:p>
           </p:txBody>
         </p:sp>
@@ -8687,15 +8420,6 @@
                 </a:rPr>
                 <a:t>truck_id</a:t>
               </a:r>
-              <a:endParaRPr lang="en-US" sz="1000" b="1" u="sng" smtClean="0">
-                <a:solidFill>
-                  <a:schemeClr val="tx1">
-                    <a:lumMod val="65000"/>
-                    <a:lumOff val="35000"/>
-                  </a:schemeClr>
-                </a:solidFill>
-                <a:latin typeface="Lucida Console" panose="020B0609040504020204" pitchFamily="49" charset="0"/>
-              </a:endParaRPr>
             </a:p>
           </p:txBody>
         </p:sp>
@@ -8785,15 +8509,6 @@
                 </a:rPr>
                 <a:t>truck</a:t>
               </a:r>
-              <a:endParaRPr lang="en-US" sz="1200" b="1" smtClean="0">
-                <a:solidFill>
-                  <a:schemeClr val="tx1">
-                    <a:lumMod val="65000"/>
-                    <a:lumOff val="35000"/>
-                  </a:schemeClr>
-                </a:solidFill>
-                <a:latin typeface="Lucida Sans" panose="020B0602030504020204" pitchFamily="34" charset="0"/>
-              </a:endParaRPr>
             </a:p>
           </p:txBody>
         </p:sp>
@@ -8868,15 +8583,6 @@
                 </a:rPr>
                 <a:t>id</a:t>
               </a:r>
-              <a:endParaRPr lang="en-US" sz="1000" b="1" smtClean="0">
-                <a:solidFill>
-                  <a:schemeClr val="tx1">
-                    <a:lumMod val="65000"/>
-                    <a:lumOff val="35000"/>
-                  </a:schemeClr>
-                </a:solidFill>
-                <a:latin typeface="Lucida Console" panose="020B0609040504020204" pitchFamily="49" charset="0"/>
-              </a:endParaRPr>
             </a:p>
           </p:txBody>
         </p:sp>
@@ -8951,15 +8657,6 @@
                 </a:rPr>
                 <a:t>vehicle_capacity</a:t>
               </a:r>
-              <a:endParaRPr lang="en-US" sz="1000" smtClean="0">
-                <a:solidFill>
-                  <a:schemeClr val="tx1">
-                    <a:lumMod val="65000"/>
-                    <a:lumOff val="35000"/>
-                  </a:schemeClr>
-                </a:solidFill>
-                <a:latin typeface="Lucida Console" panose="020B0609040504020204" pitchFamily="49" charset="0"/>
-              </a:endParaRPr>
             </a:p>
           </p:txBody>
         </p:sp>
@@ -9034,15 +8731,6 @@
                 </a:rPr>
                 <a:t>brand</a:t>
               </a:r>
-              <a:endParaRPr lang="en-US" sz="1000" smtClean="0">
-                <a:solidFill>
-                  <a:schemeClr val="tx1">
-                    <a:lumMod val="65000"/>
-                    <a:lumOff val="35000"/>
-                  </a:schemeClr>
-                </a:solidFill>
-                <a:latin typeface="Lucida Console" panose="020B0609040504020204" pitchFamily="49" charset="0"/>
-              </a:endParaRPr>
             </a:p>
           </p:txBody>
         </p:sp>
@@ -9117,15 +8805,6 @@
                 </a:rPr>
                 <a:t>model</a:t>
               </a:r>
-              <a:endParaRPr lang="en-US" sz="1000" smtClean="0">
-                <a:solidFill>
-                  <a:schemeClr val="tx1">
-                    <a:lumMod val="65000"/>
-                    <a:lumOff val="35000"/>
-                  </a:schemeClr>
-                </a:solidFill>
-                <a:latin typeface="Lucida Console" panose="020B0609040504020204" pitchFamily="49" charset="0"/>
-              </a:endParaRPr>
             </a:p>
           </p:txBody>
         </p:sp>
@@ -9200,15 +8879,6 @@
                 </a:rPr>
                 <a:t>engine</a:t>
               </a:r>
-              <a:endParaRPr lang="en-US" sz="1000" smtClean="0">
-                <a:solidFill>
-                  <a:schemeClr val="tx1">
-                    <a:lumMod val="65000"/>
-                    <a:lumOff val="35000"/>
-                  </a:schemeClr>
-                </a:solidFill>
-                <a:latin typeface="Lucida Console" panose="020B0609040504020204" pitchFamily="49" charset="0"/>
-              </a:endParaRPr>
             </a:p>
           </p:txBody>
         </p:sp>
@@ -9283,15 +8953,6 @@
                 </a:rPr>
                 <a:t>tires_serial</a:t>
               </a:r>
-              <a:endParaRPr lang="en-US" sz="1000" smtClean="0">
-                <a:solidFill>
-                  <a:schemeClr val="tx1">
-                    <a:lumMod val="65000"/>
-                    <a:lumOff val="35000"/>
-                  </a:schemeClr>
-                </a:solidFill>
-                <a:latin typeface="Lucida Console" panose="020B0609040504020204" pitchFamily="49" charset="0"/>
-              </a:endParaRPr>
             </a:p>
           </p:txBody>
         </p:sp>
@@ -9366,15 +9027,6 @@
                 </a:rPr>
                 <a:t>age</a:t>
               </a:r>
-              <a:endParaRPr lang="en-US" sz="1000" smtClean="0">
-                <a:solidFill>
-                  <a:schemeClr val="tx1">
-                    <a:lumMod val="65000"/>
-                    <a:lumOff val="35000"/>
-                  </a:schemeClr>
-                </a:solidFill>
-                <a:latin typeface="Lucida Console" panose="020B0609040504020204" pitchFamily="49" charset="0"/>
-              </a:endParaRPr>
             </a:p>
           </p:txBody>
         </p:sp>
@@ -9464,15 +9116,6 @@
                 </a:rPr>
                 <a:t>delivery_order</a:t>
               </a:r>
-              <a:endParaRPr lang="en-US" sz="1200" b="1" smtClean="0">
-                <a:solidFill>
-                  <a:schemeClr val="tx1">
-                    <a:lumMod val="65000"/>
-                    <a:lumOff val="35000"/>
-                  </a:schemeClr>
-                </a:solidFill>
-                <a:latin typeface="Lucida Sans" panose="020B0602030504020204" pitchFamily="34" charset="0"/>
-              </a:endParaRPr>
             </a:p>
           </p:txBody>
         </p:sp>
@@ -9547,15 +9190,6 @@
                 </a:rPr>
                 <a:t>id</a:t>
               </a:r>
-              <a:endParaRPr lang="en-US" sz="1000" b="1" smtClean="0">
-                <a:solidFill>
-                  <a:schemeClr val="tx1">
-                    <a:lumMod val="65000"/>
-                    <a:lumOff val="35000"/>
-                  </a:schemeClr>
-                </a:solidFill>
-                <a:latin typeface="Lucida Console" panose="020B0609040504020204" pitchFamily="49" charset="0"/>
-              </a:endParaRPr>
             </a:p>
           </p:txBody>
         </p:sp>
@@ -9630,15 +9264,6 @@
                 </a:rPr>
                 <a:t>creation_ts</a:t>
               </a:r>
-              <a:endParaRPr lang="en-US" sz="1000" smtClean="0">
-                <a:solidFill>
-                  <a:schemeClr val="tx1">
-                    <a:lumMod val="65000"/>
-                    <a:lumOff val="35000"/>
-                  </a:schemeClr>
-                </a:solidFill>
-                <a:latin typeface="Lucida Console" panose="020B0609040504020204" pitchFamily="49" charset="0"/>
-              </a:endParaRPr>
             </a:p>
           </p:txBody>
         </p:sp>
@@ -9713,15 +9338,6 @@
                 </a:rPr>
                 <a:t>take_cars_dt</a:t>
               </a:r>
-              <a:endParaRPr lang="en-US" sz="1000" smtClean="0">
-                <a:solidFill>
-                  <a:schemeClr val="tx1">
-                    <a:lumMod val="65000"/>
-                    <a:lumOff val="35000"/>
-                  </a:schemeClr>
-                </a:solidFill>
-                <a:latin typeface="Lucida Console" panose="020B0609040504020204" pitchFamily="49" charset="0"/>
-              </a:endParaRPr>
             </a:p>
           </p:txBody>
         </p:sp>
@@ -9796,15 +9412,6 @@
                 </a:rPr>
                 <a:t>status</a:t>
               </a:r>
-              <a:endParaRPr lang="en-US" sz="1000" smtClean="0">
-                <a:solidFill>
-                  <a:schemeClr val="tx1">
-                    <a:lumMod val="65000"/>
-                    <a:lumOff val="35000"/>
-                  </a:schemeClr>
-                </a:solidFill>
-                <a:latin typeface="Lucida Console" panose="020B0609040504020204" pitchFamily="49" charset="0"/>
-              </a:endParaRPr>
             </a:p>
           </p:txBody>
         </p:sp>
@@ -9879,15 +9486,6 @@
                 </a:rPr>
                 <a:t>deliver_cars_dt</a:t>
               </a:r>
-              <a:endParaRPr lang="en-US" sz="1000" smtClean="0">
-                <a:solidFill>
-                  <a:schemeClr val="tx1">
-                    <a:lumMod val="65000"/>
-                    <a:lumOff val="35000"/>
-                  </a:schemeClr>
-                </a:solidFill>
-                <a:latin typeface="Lucida Console" panose="020B0609040504020204" pitchFamily="49" charset="0"/>
-              </a:endParaRPr>
             </a:p>
           </p:txBody>
         </p:sp>
@@ -9962,15 +9560,6 @@
                 </a:rPr>
                 <a:t>truck_id</a:t>
               </a:r>
-              <a:endParaRPr lang="en-US" sz="1000" u="sng" smtClean="0">
-                <a:solidFill>
-                  <a:schemeClr val="tx1">
-                    <a:lumMod val="65000"/>
-                    <a:lumOff val="35000"/>
-                  </a:schemeClr>
-                </a:solidFill>
-                <a:latin typeface="Lucida Console" panose="020B0609040504020204" pitchFamily="49" charset="0"/>
-              </a:endParaRPr>
             </a:p>
           </p:txBody>
         </p:sp>
@@ -10045,15 +9634,6 @@
                 </a:rPr>
                 <a:t>car_id</a:t>
               </a:r>
-              <a:endParaRPr lang="en-US" sz="1000" u="sng" smtClean="0">
-                <a:solidFill>
-                  <a:schemeClr val="tx1">
-                    <a:lumMod val="65000"/>
-                    <a:lumOff val="35000"/>
-                  </a:schemeClr>
-                </a:solidFill>
-                <a:latin typeface="Lucida Console" panose="020B0609040504020204" pitchFamily="49" charset="0"/>
-              </a:endParaRPr>
             </a:p>
           </p:txBody>
         </p:sp>
@@ -10128,15 +9708,6 @@
                 </a:rPr>
                 <a:t>manufacturer_id</a:t>
               </a:r>
-              <a:endParaRPr lang="en-US" sz="1000" u="sng" smtClean="0">
-                <a:solidFill>
-                  <a:schemeClr val="tx1">
-                    <a:lumMod val="65000"/>
-                    <a:lumOff val="35000"/>
-                  </a:schemeClr>
-                </a:solidFill>
-                <a:latin typeface="Lucida Console" panose="020B0609040504020204" pitchFamily="49" charset="0"/>
-              </a:endParaRPr>
             </a:p>
           </p:txBody>
         </p:sp>
@@ -10211,15 +9782,6 @@
                 </a:rPr>
                 <a:t>shop_id</a:t>
               </a:r>
-              <a:endParaRPr lang="en-US" sz="1000" u="sng" smtClean="0">
-                <a:solidFill>
-                  <a:schemeClr val="tx1">
-                    <a:lumMod val="65000"/>
-                    <a:lumOff val="35000"/>
-                  </a:schemeClr>
-                </a:solidFill>
-                <a:latin typeface="Lucida Console" panose="020B0609040504020204" pitchFamily="49" charset="0"/>
-              </a:endParaRPr>
             </a:p>
           </p:txBody>
         </p:sp>
@@ -10294,15 +9856,6 @@
                 </a:rPr>
                 <a:t>quantity</a:t>
               </a:r>
-              <a:endParaRPr lang="en-US" sz="1000" smtClean="0">
-                <a:solidFill>
-                  <a:schemeClr val="tx1">
-                    <a:lumMod val="65000"/>
-                    <a:lumOff val="35000"/>
-                  </a:schemeClr>
-                </a:solidFill>
-                <a:latin typeface="Lucida Console" panose="020B0609040504020204" pitchFamily="49" charset="0"/>
-              </a:endParaRPr>
             </a:p>
           </p:txBody>
         </p:sp>
@@ -10377,15 +9930,6 @@
                 </a:rPr>
                 <a:t>price</a:t>
               </a:r>
-              <a:endParaRPr lang="en-US" sz="1000" smtClean="0">
-                <a:solidFill>
-                  <a:schemeClr val="tx1">
-                    <a:lumMod val="65000"/>
-                    <a:lumOff val="35000"/>
-                  </a:schemeClr>
-                </a:solidFill>
-                <a:latin typeface="Lucida Console" panose="020B0609040504020204" pitchFamily="49" charset="0"/>
-              </a:endParaRPr>
             </a:p>
           </p:txBody>
         </p:sp>
@@ -10475,15 +10019,6 @@
                 </a:rPr>
                 <a:t>car</a:t>
               </a:r>
-              <a:endParaRPr lang="en-US" sz="1200" b="1" smtClean="0">
-                <a:solidFill>
-                  <a:schemeClr val="tx1">
-                    <a:lumMod val="65000"/>
-                    <a:lumOff val="35000"/>
-                  </a:schemeClr>
-                </a:solidFill>
-                <a:latin typeface="Lucida Sans" panose="020B0602030504020204" pitchFamily="34" charset="0"/>
-              </a:endParaRPr>
             </a:p>
           </p:txBody>
         </p:sp>
@@ -10558,15 +10093,6 @@
                 </a:rPr>
                 <a:t>id</a:t>
               </a:r>
-              <a:endParaRPr lang="en-US" sz="1000" b="1" smtClean="0">
-                <a:solidFill>
-                  <a:schemeClr val="tx1">
-                    <a:lumMod val="65000"/>
-                    <a:lumOff val="35000"/>
-                  </a:schemeClr>
-                </a:solidFill>
-                <a:latin typeface="Lucida Console" panose="020B0609040504020204" pitchFamily="49" charset="0"/>
-              </a:endParaRPr>
             </a:p>
           </p:txBody>
         </p:sp>
@@ -10641,15 +10167,6 @@
                 </a:rPr>
                 <a:t>brand</a:t>
               </a:r>
-              <a:endParaRPr lang="en-US" sz="1000" smtClean="0">
-                <a:solidFill>
-                  <a:schemeClr val="tx1">
-                    <a:lumMod val="65000"/>
-                    <a:lumOff val="35000"/>
-                  </a:schemeClr>
-                </a:solidFill>
-                <a:latin typeface="Lucida Console" panose="020B0609040504020204" pitchFamily="49" charset="0"/>
-              </a:endParaRPr>
             </a:p>
           </p:txBody>
         </p:sp>
@@ -10724,15 +10241,6 @@
                 </a:rPr>
                 <a:t>model</a:t>
               </a:r>
-              <a:endParaRPr lang="en-US" sz="1000" smtClean="0">
-                <a:solidFill>
-                  <a:schemeClr val="tx1">
-                    <a:lumMod val="65000"/>
-                    <a:lumOff val="35000"/>
-                  </a:schemeClr>
-                </a:solidFill>
-                <a:latin typeface="Lucida Console" panose="020B0609040504020204" pitchFamily="49" charset="0"/>
-              </a:endParaRPr>
             </a:p>
           </p:txBody>
         </p:sp>
@@ -10807,15 +10315,6 @@
                 </a:rPr>
                 <a:t>series_name</a:t>
               </a:r>
-              <a:endParaRPr lang="en-US" sz="1000" smtClean="0">
-                <a:solidFill>
-                  <a:schemeClr val="tx1">
-                    <a:lumMod val="65000"/>
-                    <a:lumOff val="35000"/>
-                  </a:schemeClr>
-                </a:solidFill>
-                <a:latin typeface="Lucida Console" panose="020B0609040504020204" pitchFamily="49" charset="0"/>
-              </a:endParaRPr>
             </a:p>
           </p:txBody>
         </p:sp>
@@ -10902,15 +10401,6 @@
                 </a:rPr>
                 <a:t>anufacture_dt</a:t>
               </a:r>
-              <a:endParaRPr lang="en-US" sz="1000" smtClean="0">
-                <a:solidFill>
-                  <a:schemeClr val="tx1">
-                    <a:lumMod val="65000"/>
-                    <a:lumOff val="35000"/>
-                  </a:schemeClr>
-                </a:solidFill>
-                <a:latin typeface="Lucida Console" panose="020B0609040504020204" pitchFamily="49" charset="0"/>
-              </a:endParaRPr>
             </a:p>
           </p:txBody>
         </p:sp>
@@ -10985,15 +10475,6 @@
                 </a:rPr>
                 <a:t>is_new</a:t>
               </a:r>
-              <a:endParaRPr lang="en-US" sz="1000" smtClean="0">
-                <a:solidFill>
-                  <a:schemeClr val="tx1">
-                    <a:lumMod val="65000"/>
-                    <a:lumOff val="35000"/>
-                  </a:schemeClr>
-                </a:solidFill>
-                <a:latin typeface="Lucida Console" panose="020B0609040504020204" pitchFamily="49" charset="0"/>
-              </a:endParaRPr>
             </a:p>
           </p:txBody>
         </p:sp>
@@ -11083,15 +10564,6 @@
                 </a:rPr>
                 <a:t>point_of_interest</a:t>
               </a:r>
-              <a:endParaRPr lang="en-US" sz="1200" b="1" smtClean="0">
-                <a:solidFill>
-                  <a:schemeClr val="tx1">
-                    <a:lumMod val="65000"/>
-                    <a:lumOff val="35000"/>
-                  </a:schemeClr>
-                </a:solidFill>
-                <a:latin typeface="Lucida Sans" panose="020B0602030504020204" pitchFamily="34" charset="0"/>
-              </a:endParaRPr>
             </a:p>
           </p:txBody>
         </p:sp>
@@ -11166,15 +10638,6 @@
                 </a:rPr>
                 <a:t>id</a:t>
               </a:r>
-              <a:endParaRPr lang="en-US" sz="1000" b="1" smtClean="0">
-                <a:solidFill>
-                  <a:schemeClr val="tx1">
-                    <a:lumMod val="65000"/>
-                    <a:lumOff val="35000"/>
-                  </a:schemeClr>
-                </a:solidFill>
-                <a:latin typeface="Lucida Console" panose="020B0609040504020204" pitchFamily="49" charset="0"/>
-              </a:endParaRPr>
             </a:p>
           </p:txBody>
         </p:sp>
@@ -11249,15 +10712,6 @@
                 </a:rPr>
                 <a:t>name</a:t>
               </a:r>
-              <a:endParaRPr lang="en-US" sz="1000" smtClean="0">
-                <a:solidFill>
-                  <a:schemeClr val="tx1">
-                    <a:lumMod val="65000"/>
-                    <a:lumOff val="35000"/>
-                  </a:schemeClr>
-                </a:solidFill>
-                <a:latin typeface="Lucida Console" panose="020B0609040504020204" pitchFamily="49" charset="0"/>
-              </a:endParaRPr>
             </a:p>
           </p:txBody>
         </p:sp>
@@ -11332,15 +10786,6 @@
                 </a:rPr>
                 <a:t>longitude</a:t>
               </a:r>
-              <a:endParaRPr lang="en-US" sz="1000" smtClean="0">
-                <a:solidFill>
-                  <a:schemeClr val="tx1">
-                    <a:lumMod val="65000"/>
-                    <a:lumOff val="35000"/>
-                  </a:schemeClr>
-                </a:solidFill>
-                <a:latin typeface="Lucida Console" panose="020B0609040504020204" pitchFamily="49" charset="0"/>
-              </a:endParaRPr>
             </a:p>
           </p:txBody>
         </p:sp>
@@ -11415,15 +10860,6 @@
                 </a:rPr>
                 <a:t>latitude</a:t>
               </a:r>
-              <a:endParaRPr lang="en-US" sz="1000" smtClean="0">
-                <a:solidFill>
-                  <a:schemeClr val="tx1">
-                    <a:lumMod val="65000"/>
-                    <a:lumOff val="35000"/>
-                  </a:schemeClr>
-                </a:solidFill>
-                <a:latin typeface="Lucida Console" panose="020B0609040504020204" pitchFamily="49" charset="0"/>
-              </a:endParaRPr>
             </a:p>
           </p:txBody>
         </p:sp>
@@ -11498,15 +10934,6 @@
                 </a:rPr>
                 <a:t>type</a:t>
               </a:r>
-              <a:endParaRPr lang="en-US" sz="1000" smtClean="0">
-                <a:solidFill>
-                  <a:schemeClr val="tx1">
-                    <a:lumMod val="65000"/>
-                    <a:lumOff val="35000"/>
-                  </a:schemeClr>
-                </a:solidFill>
-                <a:latin typeface="Lucida Console" panose="020B0609040504020204" pitchFamily="49" charset="0"/>
-              </a:endParaRPr>
             </a:p>
           </p:txBody>
         </p:sp>
@@ -11596,15 +11023,6 @@
                 </a:rPr>
                 <a:t>sms_user</a:t>
               </a:r>
-              <a:endParaRPr lang="en-US" sz="1200" b="1" smtClean="0">
-                <a:solidFill>
-                  <a:schemeClr val="tx1">
-                    <a:lumMod val="65000"/>
-                    <a:lumOff val="35000"/>
-                  </a:schemeClr>
-                </a:solidFill>
-                <a:latin typeface="Lucida Sans" panose="020B0602030504020204" pitchFamily="34" charset="0"/>
-              </a:endParaRPr>
             </a:p>
           </p:txBody>
         </p:sp>
@@ -11679,63 +11097,10 @@
                 </a:rPr>
                 <a:t>id</a:t>
               </a:r>
-              <a:endParaRPr lang="en-US" sz="1000" b="1" smtClean="0">
-                <a:solidFill>
-                  <a:schemeClr val="tx1">
-                    <a:lumMod val="65000"/>
-                    <a:lumOff val="35000"/>
-                  </a:schemeClr>
-                </a:solidFill>
-                <a:latin typeface="Lucida Console" panose="020B0609040504020204" pitchFamily="49" charset="0"/>
-              </a:endParaRPr>
             </a:p>
           </p:txBody>
         </p:sp>
       </p:grpSp>
-      <p:cxnSp>
-        <p:nvCxnSpPr>
-          <p:cNvPr id="137" name="Elbow Connector 136"/>
-          <p:cNvCxnSpPr>
-            <a:stCxn id="5" idx="2"/>
-            <a:endCxn id="149" idx="3"/>
-          </p:cNvCxnSpPr>
-          <p:nvPr/>
-        </p:nvCxnSpPr>
-        <p:spPr>
-          <a:xfrm rot="16200000" flipH="1">
-            <a:off x="3487461" y="-159520"/>
-            <a:ext cx="900160" cy="2731347"/>
-          </a:xfrm>
-          <a:prstGeom prst="bentConnector3">
-            <a:avLst>
-              <a:gd name="adj1" fmla="val 125395"/>
-            </a:avLst>
-          </a:prstGeom>
-          <a:ln w="19050">
-            <a:solidFill>
-              <a:schemeClr val="tx2">
-                <a:lumMod val="20000"/>
-                <a:lumOff val="80000"/>
-              </a:schemeClr>
-            </a:solidFill>
-            <a:tailEnd type="arrow"/>
-          </a:ln>
-        </p:spPr>
-        <p:style>
-          <a:lnRef idx="1">
-            <a:schemeClr val="accent1"/>
-          </a:lnRef>
-          <a:fillRef idx="0">
-            <a:schemeClr val="accent1"/>
-          </a:fillRef>
-          <a:effectRef idx="0">
-            <a:schemeClr val="accent1"/>
-          </a:effectRef>
-          <a:fontRef idx="minor">
-            <a:schemeClr val="tx1"/>
-          </a:fontRef>
-        </p:style>
-      </p:cxnSp>
       <p:cxnSp>
         <p:nvCxnSpPr>
           <p:cNvPr id="162" name="Elbow Connector 161"/>
@@ -11834,8 +11199,8 @@
         </p:nvCxnSpPr>
         <p:spPr>
           <a:xfrm rot="5400000">
-            <a:off x="5678603" y="920747"/>
-            <a:ext cx="900160" cy="570815"/>
+            <a:off x="5751687" y="847662"/>
+            <a:ext cx="900160" cy="716984"/>
           </a:xfrm>
           <a:prstGeom prst="bentConnector3">
             <a:avLst>
@@ -11878,8 +11243,8 @@
         </p:nvCxnSpPr>
         <p:spPr>
           <a:xfrm rot="5400000">
-            <a:off x="6202340" y="400484"/>
-            <a:ext cx="896686" cy="1614815"/>
+            <a:off x="6275424" y="327399"/>
+            <a:ext cx="896686" cy="1760984"/>
           </a:xfrm>
           <a:prstGeom prst="bentConnector3">
             <a:avLst>

</xml_diff>